<commit_message>
updated argo manipulation section in final report
</commit_message>
<xml_diff>
--- a/docs/Architecture.pptx
+++ b/docs/Architecture.pptx
@@ -4010,6 +4010,161 @@
             <a:ext cx="1191079" cy="2282"/>
           </a:xfrm>
           <a:prstGeom prst="straightConnector1">
+            <a:avLst/>
+          </a:prstGeom>
+          <a:ln>
+            <a:tailEnd type="triangle"/>
+          </a:ln>
+        </p:spPr>
+        <p:style>
+          <a:lnRef idx="1">
+            <a:schemeClr val="accent1"/>
+          </a:lnRef>
+          <a:fillRef idx="0">
+            <a:schemeClr val="accent1"/>
+          </a:fillRef>
+          <a:effectRef idx="0">
+            <a:schemeClr val="accent1"/>
+          </a:effectRef>
+          <a:fontRef idx="minor">
+            <a:schemeClr val="tx1"/>
+          </a:fontRef>
+        </p:style>
+      </p:cxnSp>
+      <p:graphicFrame>
+        <p:nvGraphicFramePr>
+          <p:cNvPr id="2" name="Table 2">
+            <a:extLst>
+              <a:ext uri="{FF2B5EF4-FFF2-40B4-BE49-F238E27FC236}">
+                <a16:creationId xmlns:a16="http://schemas.microsoft.com/office/drawing/2014/main" id="{133B7D26-A473-4044-A3D4-7ABCD7FDB18A}"/>
+              </a:ext>
+            </a:extLst>
+          </p:cNvPr>
+          <p:cNvGraphicFramePr>
+            <a:graphicFrameLocks noGrp="1"/>
+          </p:cNvGraphicFramePr>
+          <p:nvPr>
+            <p:extLst>
+              <p:ext uri="{D42A27DB-BD31-4B8C-83A1-F6EECF244321}">
+                <p14:modId xmlns:p14="http://schemas.microsoft.com/office/powerpoint/2010/main" val="594966340"/>
+              </p:ext>
+            </p:extLst>
+          </p:nvPr>
+        </p:nvGraphicFramePr>
+        <p:xfrm>
+          <a:off x="5997041" y="4708719"/>
+          <a:ext cx="1536673" cy="914400"/>
+        </p:xfrm>
+        <a:graphic>
+          <a:graphicData uri="http://schemas.openxmlformats.org/drawingml/2006/table">
+            <a:tbl>
+              <a:tblPr firstRow="1" bandRow="1">
+                <a:tableStyleId>{F2DE63D5-997A-4646-A377-4702673A728D}</a:tableStyleId>
+              </a:tblPr>
+              <a:tblGrid>
+                <a:gridCol w="1536673">
+                  <a:extLst>
+                    <a:ext uri="{9D8B030D-6E8A-4147-A177-3AD203B41FA5}">
+                      <a16:colId xmlns:a16="http://schemas.microsoft.com/office/drawing/2014/main" val="2853455804"/>
+                    </a:ext>
+                  </a:extLst>
+                </a:gridCol>
+              </a:tblGrid>
+              <a:tr h="276644">
+                <a:tc>
+                  <a:txBody>
+                    <a:bodyPr/>
+                    <a:lstStyle/>
+                    <a:p>
+                      <a:r>
+                        <a:rPr lang="en-US" sz="1400" dirty="0"/>
+                        <a:t>Tables</a:t>
+                      </a:r>
+                      <a:endParaRPr lang="en-CA" sz="1400" dirty="0"/>
+                    </a:p>
+                  </a:txBody>
+                  <a:tcPr>
+                    <a:solidFill>
+                      <a:schemeClr val="tx2">
+                        <a:lumMod val="75000"/>
+                      </a:schemeClr>
+                    </a:solidFill>
+                  </a:tcPr>
+                </a:tc>
+                <a:extLst>
+                  <a:ext uri="{0D108BD9-81ED-4DB2-BD59-A6C34878D82A}">
+                    <a16:rowId xmlns:a16="http://schemas.microsoft.com/office/drawing/2014/main" val="1454203698"/>
+                  </a:ext>
+                </a:extLst>
+              </a:tr>
+              <a:tr h="276644">
+                <a:tc>
+                  <a:txBody>
+                    <a:bodyPr/>
+                    <a:lstStyle/>
+                    <a:p>
+                      <a:r>
+                        <a:rPr lang="en-US" sz="1400" dirty="0" err="1"/>
+                        <a:t>ocean_data</a:t>
+                      </a:r>
+                      <a:endParaRPr lang="en-CA" sz="1400" dirty="0"/>
+                    </a:p>
+                  </a:txBody>
+                  <a:tcPr/>
+                </a:tc>
+                <a:extLst>
+                  <a:ext uri="{0D108BD9-81ED-4DB2-BD59-A6C34878D82A}">
+                    <a16:rowId xmlns:a16="http://schemas.microsoft.com/office/drawing/2014/main" val="1790686296"/>
+                  </a:ext>
+                </a:extLst>
+              </a:tr>
+              <a:tr h="276644">
+                <a:tc>
+                  <a:txBody>
+                    <a:bodyPr/>
+                    <a:lstStyle/>
+                    <a:p>
+                      <a:r>
+                        <a:rPr lang="en-US" sz="1400" dirty="0" err="1"/>
+                        <a:t>fish_data</a:t>
+                      </a:r>
+                      <a:endParaRPr lang="en-CA" sz="1400" dirty="0"/>
+                    </a:p>
+                  </a:txBody>
+                  <a:tcPr/>
+                </a:tc>
+                <a:extLst>
+                  <a:ext uri="{0D108BD9-81ED-4DB2-BD59-A6C34878D82A}">
+                    <a16:rowId xmlns:a16="http://schemas.microsoft.com/office/drawing/2014/main" val="1319978407"/>
+                  </a:ext>
+                </a:extLst>
+              </a:tr>
+            </a:tbl>
+          </a:graphicData>
+        </a:graphic>
+      </p:graphicFrame>
+      <p:cxnSp>
+        <p:nvCxnSpPr>
+          <p:cNvPr id="19" name="Straight Arrow Connector 18">
+            <a:extLst>
+              <a:ext uri="{FF2B5EF4-FFF2-40B4-BE49-F238E27FC236}">
+                <a16:creationId xmlns:a16="http://schemas.microsoft.com/office/drawing/2014/main" id="{5FA3A3BD-250F-4814-8E7A-D473519F810E}"/>
+              </a:ext>
+            </a:extLst>
+          </p:cNvPr>
+          <p:cNvCxnSpPr>
+            <a:cxnSpLocks/>
+            <a:stCxn id="1032" idx="2"/>
+            <a:endCxn id="2" idx="1"/>
+          </p:cNvCxnSpPr>
+          <p:nvPr/>
+        </p:nvCxnSpPr>
+        <p:spPr>
+          <a:xfrm rot="16200000" flipH="1">
+            <a:off x="4506801" y="3675679"/>
+            <a:ext cx="2566638" cy="413841"/>
+          </a:xfrm>
+          <a:prstGeom prst="bentConnector2">
             <a:avLst/>
           </a:prstGeom>
           <a:ln>

</xml_diff>